<commit_message>
update de cuong version 0.3
</commit_message>
<xml_diff>
--- a/De Cuong/De Cuong v0.2.pptx
+++ b/De Cuong/De Cuong v0.2.pptx
@@ -7704,11 +7704,7 @@
             </a:r>
             <a:r>
               <a:rPr lang="en-US" dirty="0" smtClean="0"/>
-              <a:t>: </a:t>
-            </a:r>
-            <a:r>
-              <a:rPr lang="en-US" dirty="0" smtClean="0"/>
-              <a:t>GATE (ANNIE </a:t>
+              <a:t>: GATE (ANNIE </a:t>
             </a:r>
             <a:r>
               <a:rPr lang="en-US" dirty="0" err="1" smtClean="0"/>
@@ -10082,44 +10078,20 @@
               <a:t>thống</a:t>
             </a:r>
             <a:r>
-              <a:rPr lang="en-US" dirty="0" smtClean="0"/>
-              <a:t> </a:t>
-            </a:r>
-            <a:r>
-              <a:rPr lang="en-US" dirty="0" err="1" smtClean="0"/>
-              <a:t>hỏi</a:t>
-            </a:r>
-            <a:r>
-              <a:rPr lang="en-US" dirty="0" smtClean="0"/>
-              <a:t> </a:t>
-            </a:r>
-            <a:r>
-              <a:rPr lang="en-US" dirty="0" err="1" smtClean="0"/>
-              <a:t>đáp</a:t>
-            </a:r>
-            <a:r>
-              <a:rPr lang="en-US" dirty="0" smtClean="0"/>
-              <a:t> do </a:t>
-            </a:r>
-            <a:r>
-              <a:rPr lang="en-US" dirty="0" err="1" smtClean="0"/>
-              <a:t>nhóm</a:t>
-            </a:r>
-            <a:r>
-              <a:rPr lang="en-US" dirty="0" smtClean="0"/>
-              <a:t> </a:t>
-            </a:r>
-            <a:r>
-              <a:rPr lang="en-US" dirty="0" err="1" smtClean="0"/>
-              <a:t>đưa</a:t>
-            </a:r>
-            <a:r>
-              <a:rPr lang="en-US" dirty="0" smtClean="0"/>
-              <a:t> </a:t>
-            </a:r>
-            <a:r>
-              <a:rPr lang="en-US" dirty="0" err="1" smtClean="0"/>
-              <a:t>ra</a:t>
+              <a:rPr lang="en-US" smtClean="0"/>
+              <a:t> </a:t>
+            </a:r>
+            <a:r>
+              <a:rPr lang="en-US" smtClean="0"/>
+              <a:t>đề</a:t>
+            </a:r>
+            <a:r>
+              <a:rPr lang="en-US" dirty="0" smtClean="0"/>
+              <a:t> </a:t>
+            </a:r>
+            <a:r>
+              <a:rPr lang="en-US" dirty="0" err="1" smtClean="0"/>
+              <a:t>xuất</a:t>
             </a:r>
             <a:endParaRPr lang="en-US" dirty="0"/>
           </a:p>
@@ -16330,11 +16302,7 @@
             <a:pPr lvl="1"/>
             <a:r>
               <a:rPr lang="en-US" dirty="0" smtClean="0"/>
-              <a:t>Who is the author of the paper “A Comparative Evaluation of Voting and Meta-learning on Partitioned Data</a:t>
-            </a:r>
-            <a:r>
-              <a:rPr lang="en-US" dirty="0" smtClean="0"/>
-              <a:t>”?</a:t>
+              <a:t>Who is the author of the paper “A Comparative Evaluation of Voting and Meta-learning on Partitioned Data”?</a:t>
             </a:r>
             <a:endParaRPr lang="en-US" sz="2000" dirty="0" smtClean="0"/>
           </a:p>
@@ -16351,7 +16319,6 @@
               <a:rPr lang="en-US" dirty="0" smtClean="0"/>
               <a:t>… </a:t>
             </a:r>
-            <a:endParaRPr lang="en-US" dirty="0" smtClean="0"/>
           </a:p>
           <a:p>
             <a:pPr lvl="1"/>

</xml_diff>